<commit_message>
updates and grammar fix in tutorial 1
</commit_message>
<xml_diff>
--- a/intro_talks/LATW_opening_talk.pptx
+++ b/intro_talks/LATW_opening_talk.pptx
@@ -9284,6 +9284,86 @@
         </a:p>
       </dgm:t>
     </dgm:pt>
+    <dgm:pt modelId="{A2FCC475-836C-CD48-9EA1-B9DB857699E9}">
+      <dgm:prSet/>
+      <dgm:spPr>
+        <a:solidFill>
+          <a:srgbClr val="00C6BB"/>
+        </a:solidFill>
+      </dgm:spPr>
+      <dgm:t>
+        <a:bodyPr/>
+        <a:lstStyle/>
+        <a:p>
+          <a:r>
+            <a:rPr lang="en-US" dirty="0"/>
+            <a:t>GPU parallelized multiple ensemble samplers</a:t>
+          </a:r>
+        </a:p>
+      </dgm:t>
+    </dgm:pt>
+    <dgm:pt modelId="{09F06B5B-90C2-374E-B72C-2585F088E9F4}" type="parTrans" cxnId="{56226A99-2E35-4F48-AE20-6CE9AC56922F}">
+      <dgm:prSet/>
+      <dgm:spPr/>
+      <dgm:t>
+        <a:bodyPr/>
+        <a:lstStyle/>
+        <a:p>
+          <a:endParaRPr lang="en-US"/>
+        </a:p>
+      </dgm:t>
+    </dgm:pt>
+    <dgm:pt modelId="{F6A15587-E019-AD42-BAD0-B1890EB71D59}" type="sibTrans" cxnId="{56226A99-2E35-4F48-AE20-6CE9AC56922F}">
+      <dgm:prSet/>
+      <dgm:spPr/>
+      <dgm:t>
+        <a:bodyPr/>
+        <a:lstStyle/>
+        <a:p>
+          <a:endParaRPr lang="en-US"/>
+        </a:p>
+      </dgm:t>
+    </dgm:pt>
+    <dgm:pt modelId="{C1A82D08-6AA6-264A-AD72-025DE24DC893}">
+      <dgm:prSet/>
+      <dgm:spPr>
+        <a:solidFill>
+          <a:srgbClr val="00C6BB"/>
+        </a:solidFill>
+      </dgm:spPr>
+      <dgm:t>
+        <a:bodyPr/>
+        <a:lstStyle/>
+        <a:p>
+          <a:r>
+            <a:rPr lang="en-US" dirty="0"/>
+            <a:t>GPU pip install</a:t>
+          </a:r>
+        </a:p>
+      </dgm:t>
+    </dgm:pt>
+    <dgm:pt modelId="{64253B34-2DC2-384F-B79E-21E85EEB011B}" type="parTrans" cxnId="{6D846008-44A3-294F-89A3-0542DBB3F8AC}">
+      <dgm:prSet/>
+      <dgm:spPr/>
+      <dgm:t>
+        <a:bodyPr/>
+        <a:lstStyle/>
+        <a:p>
+          <a:endParaRPr lang="en-US"/>
+        </a:p>
+      </dgm:t>
+    </dgm:pt>
+    <dgm:pt modelId="{12D3A6BD-E08C-0B41-84DC-2BDA3FF89C31}" type="sibTrans" cxnId="{6D846008-44A3-294F-89A3-0542DBB3F8AC}">
+      <dgm:prSet/>
+      <dgm:spPr/>
+      <dgm:t>
+        <a:bodyPr/>
+        <a:lstStyle/>
+        <a:p>
+          <a:endParaRPr lang="en-US"/>
+        </a:p>
+      </dgm:t>
+    </dgm:pt>
     <dgm:pt modelId="{A9905E29-A1C5-2342-BA10-4790D9214411}" type="pres">
       <dgm:prSet presAssocID="{149E38F7-A0BA-4A26-A5CF-05413BA0687B}" presName="diagram" presStyleCnt="0">
         <dgm:presLayoutVars>
@@ -9294,7 +9374,7 @@
       <dgm:spPr/>
     </dgm:pt>
     <dgm:pt modelId="{570141B7-1DCD-914E-B7B0-FE8E8750DFBE}" type="pres">
-      <dgm:prSet presAssocID="{7EB37EBD-0BFA-452D-A43D-10C34C4A17D9}" presName="node" presStyleLbl="node1" presStyleIdx="0" presStyleCnt="6" custScaleY="74017">
+      <dgm:prSet presAssocID="{7EB37EBD-0BFA-452D-A43D-10C34C4A17D9}" presName="node" presStyleLbl="node1" presStyleIdx="0" presStyleCnt="8" custScaleY="74017">
         <dgm:presLayoutVars>
           <dgm:bulletEnabled val="1"/>
         </dgm:presLayoutVars>
@@ -9306,7 +9386,7 @@
       <dgm:spPr/>
     </dgm:pt>
     <dgm:pt modelId="{CCBCFA79-B2A5-4E4C-A1E8-A10BEA8B9A4D}" type="pres">
-      <dgm:prSet presAssocID="{C309E49D-040A-401D-B41C-490B703E1729}" presName="node" presStyleLbl="node1" presStyleIdx="1" presStyleCnt="6" custScaleY="74017">
+      <dgm:prSet presAssocID="{C309E49D-040A-401D-B41C-490B703E1729}" presName="node" presStyleLbl="node1" presStyleIdx="1" presStyleCnt="8" custScaleY="74017">
         <dgm:presLayoutVars>
           <dgm:bulletEnabled val="1"/>
         </dgm:presLayoutVars>
@@ -9318,7 +9398,7 @@
       <dgm:spPr/>
     </dgm:pt>
     <dgm:pt modelId="{ABA5518B-2371-7844-8C04-47871FAEEA89}" type="pres">
-      <dgm:prSet presAssocID="{7B796489-B9D3-4FDB-82E2-BEA6CDE77EFA}" presName="node" presStyleLbl="node1" presStyleIdx="2" presStyleCnt="6" custScaleY="74017">
+      <dgm:prSet presAssocID="{7B796489-B9D3-4FDB-82E2-BEA6CDE77EFA}" presName="node" presStyleLbl="node1" presStyleIdx="2" presStyleCnt="8" custScaleY="74017">
         <dgm:presLayoutVars>
           <dgm:bulletEnabled val="1"/>
         </dgm:presLayoutVars>
@@ -9330,7 +9410,7 @@
       <dgm:spPr/>
     </dgm:pt>
     <dgm:pt modelId="{3CEE81E0-A85D-CE43-978D-3EE020EA09A7}" type="pres">
-      <dgm:prSet presAssocID="{C2FCF8A8-9FAE-494B-8869-DA250B0F7EC0}" presName="node" presStyleLbl="node1" presStyleIdx="3" presStyleCnt="6" custScaleY="74017">
+      <dgm:prSet presAssocID="{C2FCF8A8-9FAE-494B-8869-DA250B0F7EC0}" presName="node" presStyleLbl="node1" presStyleIdx="3" presStyleCnt="8" custScaleY="74017">
         <dgm:presLayoutVars>
           <dgm:bulletEnabled val="1"/>
         </dgm:presLayoutVars>
@@ -9342,7 +9422,7 @@
       <dgm:spPr/>
     </dgm:pt>
     <dgm:pt modelId="{8DEF1356-1D32-F645-87CF-B51FB51B0C8F}" type="pres">
-      <dgm:prSet presAssocID="{7BB675A6-5A75-4551-B60C-DFFC1B0FAB10}" presName="node" presStyleLbl="node1" presStyleIdx="4" presStyleCnt="6" custScaleY="74017">
+      <dgm:prSet presAssocID="{7BB675A6-5A75-4551-B60C-DFFC1B0FAB10}" presName="node" presStyleLbl="node1" presStyleIdx="4" presStyleCnt="8" custScaleY="74017">
         <dgm:presLayoutVars>
           <dgm:bulletEnabled val="1"/>
         </dgm:presLayoutVars>
@@ -9354,7 +9434,31 @@
       <dgm:spPr/>
     </dgm:pt>
     <dgm:pt modelId="{066A581C-BF34-4144-8F0D-B6A0CCE98E9D}" type="pres">
-      <dgm:prSet presAssocID="{654FDD39-A3C2-4A78-A192-83AB6341B6E0}" presName="node" presStyleLbl="node1" presStyleIdx="5" presStyleCnt="6" custScaleY="74017">
+      <dgm:prSet presAssocID="{654FDD39-A3C2-4A78-A192-83AB6341B6E0}" presName="node" presStyleLbl="node1" presStyleIdx="5" presStyleCnt="8" custScaleY="74017">
+        <dgm:presLayoutVars>
+          <dgm:bulletEnabled val="1"/>
+        </dgm:presLayoutVars>
+      </dgm:prSet>
+      <dgm:spPr/>
+    </dgm:pt>
+    <dgm:pt modelId="{B9FB29E7-E345-6246-AB20-FF8BA0F32089}" type="pres">
+      <dgm:prSet presAssocID="{7C8A27F8-7BC4-4592-A3D1-047730FCC6AF}" presName="sibTrans" presStyleCnt="0"/>
+      <dgm:spPr/>
+    </dgm:pt>
+    <dgm:pt modelId="{41799A00-12C1-1140-8A4E-2B952DF57F2E}" type="pres">
+      <dgm:prSet presAssocID="{A2FCC475-836C-CD48-9EA1-B9DB857699E9}" presName="node" presStyleLbl="node1" presStyleIdx="6" presStyleCnt="8">
+        <dgm:presLayoutVars>
+          <dgm:bulletEnabled val="1"/>
+        </dgm:presLayoutVars>
+      </dgm:prSet>
+      <dgm:spPr/>
+    </dgm:pt>
+    <dgm:pt modelId="{78753CD4-0BC5-A048-8EB4-23962730A698}" type="pres">
+      <dgm:prSet presAssocID="{F6A15587-E019-AD42-BAD0-B1890EB71D59}" presName="sibTrans" presStyleCnt="0"/>
+      <dgm:spPr/>
+    </dgm:pt>
+    <dgm:pt modelId="{4AA387BF-569B-354E-BBEC-1485AC97748F}" type="pres">
+      <dgm:prSet presAssocID="{C1A82D08-6AA6-264A-AD72-025DE24DC893}" presName="node" presStyleLbl="node1" presStyleIdx="7" presStyleCnt="8">
         <dgm:presLayoutVars>
           <dgm:bulletEnabled val="1"/>
         </dgm:presLayoutVars>
@@ -9363,14 +9467,18 @@
     </dgm:pt>
   </dgm:ptLst>
   <dgm:cxnLst>
+    <dgm:cxn modelId="{6D846008-44A3-294F-89A3-0542DBB3F8AC}" srcId="{149E38F7-A0BA-4A26-A5CF-05413BA0687B}" destId="{C1A82D08-6AA6-264A-AD72-025DE24DC893}" srcOrd="7" destOrd="0" parTransId="{64253B34-2DC2-384F-B79E-21E85EEB011B}" sibTransId="{12D3A6BD-E08C-0B41-84DC-2BDA3FF89C31}"/>
     <dgm:cxn modelId="{8DA6012E-A3C9-9243-BA04-2501D41D90F2}" type="presOf" srcId="{C2FCF8A8-9FAE-494B-8869-DA250B0F7EC0}" destId="{3CEE81E0-A85D-CE43-978D-3EE020EA09A7}" srcOrd="0" destOrd="0" presId="urn:microsoft.com/office/officeart/2005/8/layout/default"/>
     <dgm:cxn modelId="{18FAA933-674B-1C4E-AFF9-430691C4D16A}" type="presOf" srcId="{C309E49D-040A-401D-B41C-490B703E1729}" destId="{CCBCFA79-B2A5-4E4C-A1E8-A10BEA8B9A4D}" srcOrd="0" destOrd="0" presId="urn:microsoft.com/office/officeart/2005/8/layout/default"/>
+    <dgm:cxn modelId="{B41DB94B-D7BF-874D-9214-178DD235B739}" type="presOf" srcId="{A2FCC475-836C-CD48-9EA1-B9DB857699E9}" destId="{41799A00-12C1-1140-8A4E-2B952DF57F2E}" srcOrd="0" destOrd="0" presId="urn:microsoft.com/office/officeart/2005/8/layout/default"/>
     <dgm:cxn modelId="{27170075-939F-4547-8CA5-12DFABE61CF1}" type="presOf" srcId="{654FDD39-A3C2-4A78-A192-83AB6341B6E0}" destId="{066A581C-BF34-4144-8F0D-B6A0CCE98E9D}" srcOrd="0" destOrd="0" presId="urn:microsoft.com/office/officeart/2005/8/layout/default"/>
     <dgm:cxn modelId="{0D31DD77-8383-4407-8BF8-1302A98F0E44}" srcId="{149E38F7-A0BA-4A26-A5CF-05413BA0687B}" destId="{7EB37EBD-0BFA-452D-A43D-10C34C4A17D9}" srcOrd="0" destOrd="0" parTransId="{F640E3EA-3C26-455F-8840-6B7622189A4F}" sibTransId="{FF5703D6-A6A9-4C0C-A622-F1113CF0AA7B}"/>
     <dgm:cxn modelId="{1E936D79-6DE0-9C43-A961-ED5345E9FAE1}" type="presOf" srcId="{7B796489-B9D3-4FDB-82E2-BEA6CDE77EFA}" destId="{ABA5518B-2371-7844-8C04-47871FAEEA89}" srcOrd="0" destOrd="0" presId="urn:microsoft.com/office/officeart/2005/8/layout/default"/>
     <dgm:cxn modelId="{57754880-309E-F14A-AA4E-CD974CE21F40}" type="presOf" srcId="{7EB37EBD-0BFA-452D-A43D-10C34C4A17D9}" destId="{570141B7-1DCD-914E-B7B0-FE8E8750DFBE}" srcOrd="0" destOrd="0" presId="urn:microsoft.com/office/officeart/2005/8/layout/default"/>
+    <dgm:cxn modelId="{56226A99-2E35-4F48-AE20-6CE9AC56922F}" srcId="{149E38F7-A0BA-4A26-A5CF-05413BA0687B}" destId="{A2FCC475-836C-CD48-9EA1-B9DB857699E9}" srcOrd="6" destOrd="0" parTransId="{09F06B5B-90C2-374E-B72C-2585F088E9F4}" sibTransId="{F6A15587-E019-AD42-BAD0-B1890EB71D59}"/>
     <dgm:cxn modelId="{C0DD659D-A09C-47A4-8805-923616A4F066}" srcId="{149E38F7-A0BA-4A26-A5CF-05413BA0687B}" destId="{7BB675A6-5A75-4551-B60C-DFFC1B0FAB10}" srcOrd="4" destOrd="0" parTransId="{3759609C-6C9B-4057-B8B2-46BF321297A3}" sibTransId="{EB0DFDFB-BFB3-49DC-948E-A542185F092B}"/>
     <dgm:cxn modelId="{B1C822A5-0ED9-4693-81F5-2911AA197D82}" srcId="{149E38F7-A0BA-4A26-A5CF-05413BA0687B}" destId="{C309E49D-040A-401D-B41C-490B703E1729}" srcOrd="1" destOrd="0" parTransId="{857B06F5-0C57-4BE4-BCF7-99723B3A7BD5}" sibTransId="{D4342981-3152-4349-B77B-5A5B0A8D8BD6}"/>
+    <dgm:cxn modelId="{18FD21B0-2468-AA49-A449-AB11EB0824C3}" type="presOf" srcId="{C1A82D08-6AA6-264A-AD72-025DE24DC893}" destId="{4AA387BF-569B-354E-BBEC-1485AC97748F}" srcOrd="0" destOrd="0" presId="urn:microsoft.com/office/officeart/2005/8/layout/default"/>
     <dgm:cxn modelId="{AAB076B3-BEC9-48AE-9372-B82CE7A62CEA}" srcId="{149E38F7-A0BA-4A26-A5CF-05413BA0687B}" destId="{C2FCF8A8-9FAE-494B-8869-DA250B0F7EC0}" srcOrd="3" destOrd="0" parTransId="{4C86EBE0-73F3-4308-8EE6-F2DC535FA3E8}" sibTransId="{1899C024-4B55-4A55-928A-0AA4559F8C2D}"/>
     <dgm:cxn modelId="{BE74D1B5-DB51-4A4C-946C-75D5DB5196A0}" type="presOf" srcId="{7BB675A6-5A75-4551-B60C-DFFC1B0FAB10}" destId="{8DEF1356-1D32-F645-87CF-B51FB51B0C8F}" srcOrd="0" destOrd="0" presId="urn:microsoft.com/office/officeart/2005/8/layout/default"/>
     <dgm:cxn modelId="{B76501DB-41FF-4DEC-8996-DF3D0A0F2573}" srcId="{149E38F7-A0BA-4A26-A5CF-05413BA0687B}" destId="{7B796489-B9D3-4FDB-82E2-BEA6CDE77EFA}" srcOrd="2" destOrd="0" parTransId="{77D22551-B0C1-4D2B-ABEA-F54935BD30E6}" sibTransId="{762C6354-0084-4B0C-9DA0-EC21454A3320}"/>
@@ -9387,6 +9495,10 @@
     <dgm:cxn modelId="{EA9ABD38-735D-1C42-B2C5-522999B5F3C2}" type="presParOf" srcId="{A9905E29-A1C5-2342-BA10-4790D9214411}" destId="{8DEF1356-1D32-F645-87CF-B51FB51B0C8F}" srcOrd="8" destOrd="0" presId="urn:microsoft.com/office/officeart/2005/8/layout/default"/>
     <dgm:cxn modelId="{CCEEECDD-1C74-5A4D-9DAF-51415B90ED38}" type="presParOf" srcId="{A9905E29-A1C5-2342-BA10-4790D9214411}" destId="{1A22C32C-6ABA-AE44-A37B-A595C39BC8CA}" srcOrd="9" destOrd="0" presId="urn:microsoft.com/office/officeart/2005/8/layout/default"/>
     <dgm:cxn modelId="{F6C5682E-A334-BF4A-8513-F6B8DC1C83D6}" type="presParOf" srcId="{A9905E29-A1C5-2342-BA10-4790D9214411}" destId="{066A581C-BF34-4144-8F0D-B6A0CCE98E9D}" srcOrd="10" destOrd="0" presId="urn:microsoft.com/office/officeart/2005/8/layout/default"/>
+    <dgm:cxn modelId="{122B3127-9175-9945-98A0-772ECF2184EE}" type="presParOf" srcId="{A9905E29-A1C5-2342-BA10-4790D9214411}" destId="{B9FB29E7-E345-6246-AB20-FF8BA0F32089}" srcOrd="11" destOrd="0" presId="urn:microsoft.com/office/officeart/2005/8/layout/default"/>
+    <dgm:cxn modelId="{52310829-3364-CB4E-B1EA-A162C07635D4}" type="presParOf" srcId="{A9905E29-A1C5-2342-BA10-4790D9214411}" destId="{41799A00-12C1-1140-8A4E-2B952DF57F2E}" srcOrd="12" destOrd="0" presId="urn:microsoft.com/office/officeart/2005/8/layout/default"/>
+    <dgm:cxn modelId="{D693463E-EAE8-5E4D-845B-99DCE9C3E079}" type="presParOf" srcId="{A9905E29-A1C5-2342-BA10-4790D9214411}" destId="{78753CD4-0BC5-A048-8EB4-23962730A698}" srcOrd="13" destOrd="0" presId="urn:microsoft.com/office/officeart/2005/8/layout/default"/>
+    <dgm:cxn modelId="{8F00E3AC-C0B9-AE4E-B76B-0D3B56CE44F0}" type="presParOf" srcId="{A9905E29-A1C5-2342-BA10-4790D9214411}" destId="{4AA387BF-569B-354E-BBEC-1485AC97748F}" srcOrd="14" destOrd="0" presId="urn:microsoft.com/office/officeart/2005/8/layout/default"/>
   </dgm:cxnLst>
   <dgm:bg/>
   <dgm:whole/>
@@ -13806,8 +13918,8 @@
       </dsp:nvSpPr>
       <dsp:spPr>
         <a:xfrm>
-          <a:off x="791" y="387100"/>
-          <a:ext cx="3088494" cy="1371606"/>
+          <a:off x="656027" y="2645"/>
+          <a:ext cx="2464460" cy="1094471"/>
         </a:xfrm>
         <a:prstGeom prst="rect">
           <a:avLst/>
@@ -13835,12 +13947,12 @@
         </a:fontRef>
       </dsp:style>
       <dsp:txBody>
-        <a:bodyPr spcFirstLastPara="0" vert="horz" wrap="square" lIns="102870" tIns="102870" rIns="102870" bIns="102870" numCol="1" spcCol="1270" anchor="ctr" anchorCtr="0">
+        <a:bodyPr spcFirstLastPara="0" vert="horz" wrap="square" lIns="83820" tIns="83820" rIns="83820" bIns="83820" numCol="1" spcCol="1270" anchor="ctr" anchorCtr="0">
           <a:noAutofit/>
         </a:bodyPr>
         <a:lstStyle/>
         <a:p>
-          <a:pPr marL="0" lvl="0" indent="0" algn="ctr" defTabSz="1200150">
+          <a:pPr marL="0" lvl="0" indent="0" algn="ctr" defTabSz="977900">
             <a:lnSpc>
               <a:spcPct val="90000"/>
             </a:lnSpc>
@@ -13853,14 +13965,14 @@
             <a:buNone/>
           </a:pPr>
           <a:r>
-            <a:rPr lang="en-US" sz="2700" kern="1200"/>
+            <a:rPr lang="en-US" sz="2200" kern="1200"/>
             <a:t>Stochastic backgrounds</a:t>
           </a:r>
         </a:p>
       </dsp:txBody>
       <dsp:txXfrm>
-        <a:off x="791" y="387100"/>
-        <a:ext cx="3088494" cy="1371606"/>
+        <a:off x="656027" y="2645"/>
+        <a:ext cx="2464460" cy="1094471"/>
       </dsp:txXfrm>
     </dsp:sp>
     <dsp:sp modelId="{CCBCFA79-B2A5-4E4C-A1E8-A10BEA8B9A4D}">
@@ -13870,8 +13982,8 @@
       </dsp:nvSpPr>
       <dsp:spPr>
         <a:xfrm>
-          <a:off x="3398135" y="387100"/>
-          <a:ext cx="3088494" cy="1371606"/>
+          <a:off x="3366934" y="2645"/>
+          <a:ext cx="2464460" cy="1094471"/>
         </a:xfrm>
         <a:prstGeom prst="rect">
           <a:avLst/>
@@ -13899,12 +14011,12 @@
         </a:fontRef>
       </dsp:style>
       <dsp:txBody>
-        <a:bodyPr spcFirstLastPara="0" vert="horz" wrap="square" lIns="102870" tIns="102870" rIns="102870" bIns="102870" numCol="1" spcCol="1270" anchor="ctr" anchorCtr="0">
+        <a:bodyPr spcFirstLastPara="0" vert="horz" wrap="square" lIns="83820" tIns="83820" rIns="83820" bIns="83820" numCol="1" spcCol="1270" anchor="ctr" anchorCtr="0">
           <a:noAutofit/>
         </a:bodyPr>
         <a:lstStyle/>
         <a:p>
-          <a:pPr marL="0" lvl="0" indent="0" algn="ctr" defTabSz="1200150">
+          <a:pPr marL="0" lvl="0" indent="0" algn="ctr" defTabSz="977900">
             <a:lnSpc>
               <a:spcPct val="90000"/>
             </a:lnSpc>
@@ -13917,14 +14029,14 @@
             <a:buNone/>
           </a:pPr>
           <a:r>
-            <a:rPr lang="en-US" sz="2700" kern="1200"/>
+            <a:rPr lang="en-US" sz="2200" kern="1200"/>
             <a:t>Product-space MCMC</a:t>
           </a:r>
         </a:p>
       </dsp:txBody>
       <dsp:txXfrm>
-        <a:off x="3398135" y="387100"/>
-        <a:ext cx="3088494" cy="1371606"/>
+        <a:off x="3366934" y="2645"/>
+        <a:ext cx="2464460" cy="1094471"/>
       </dsp:txXfrm>
     </dsp:sp>
     <dsp:sp modelId="{ABA5518B-2371-7844-8C04-47871FAEEA89}">
@@ -13934,8 +14046,8 @@
       </dsp:nvSpPr>
       <dsp:spPr>
         <a:xfrm>
-          <a:off x="791" y="2067556"/>
-          <a:ext cx="3088494" cy="1371606"/>
+          <a:off x="656027" y="1343563"/>
+          <a:ext cx="2464460" cy="1094471"/>
         </a:xfrm>
         <a:prstGeom prst="rect">
           <a:avLst/>
@@ -13963,12 +14075,12 @@
         </a:fontRef>
       </dsp:style>
       <dsp:txBody>
-        <a:bodyPr spcFirstLastPara="0" vert="horz" wrap="square" lIns="102870" tIns="102870" rIns="102870" bIns="102870" numCol="1" spcCol="1270" anchor="ctr" anchorCtr="0">
+        <a:bodyPr spcFirstLastPara="0" vert="horz" wrap="square" lIns="83820" tIns="83820" rIns="83820" bIns="83820" numCol="1" spcCol="1270" anchor="ctr" anchorCtr="0">
           <a:noAutofit/>
         </a:bodyPr>
         <a:lstStyle/>
         <a:p>
-          <a:pPr marL="0" lvl="0" indent="0" algn="ctr" defTabSz="1200150">
+          <a:pPr marL="0" lvl="0" indent="0" algn="ctr" defTabSz="977900">
             <a:lnSpc>
               <a:spcPct val="90000"/>
             </a:lnSpc>
@@ -13981,14 +14093,14 @@
             <a:buNone/>
           </a:pPr>
           <a:r>
-            <a:rPr lang="en-US" sz="2700" kern="1200"/>
+            <a:rPr lang="en-US" sz="2200" kern="1200"/>
             <a:t>Flexible ODE integrators</a:t>
           </a:r>
         </a:p>
       </dsp:txBody>
       <dsp:txXfrm>
-        <a:off x="791" y="2067556"/>
-        <a:ext cx="3088494" cy="1371606"/>
+        <a:off x="656027" y="1343563"/>
+        <a:ext cx="2464460" cy="1094471"/>
       </dsp:txXfrm>
     </dsp:sp>
     <dsp:sp modelId="{3CEE81E0-A85D-CE43-978D-3EE020EA09A7}">
@@ -13998,8 +14110,8 @@
       </dsp:nvSpPr>
       <dsp:spPr>
         <a:xfrm>
-          <a:off x="3398135" y="2067556"/>
-          <a:ext cx="3088494" cy="1371606"/>
+          <a:off x="3366934" y="1343563"/>
+          <a:ext cx="2464460" cy="1094471"/>
         </a:xfrm>
         <a:prstGeom prst="rect">
           <a:avLst/>
@@ -14027,12 +14139,12 @@
         </a:fontRef>
       </dsp:style>
       <dsp:txBody>
-        <a:bodyPr spcFirstLastPara="0" vert="horz" wrap="square" lIns="102870" tIns="102870" rIns="102870" bIns="102870" numCol="1" spcCol="1270" anchor="ctr" anchorCtr="0">
+        <a:bodyPr spcFirstLastPara="0" vert="horz" wrap="square" lIns="83820" tIns="83820" rIns="83820" bIns="83820" numCol="1" spcCol="1270" anchor="ctr" anchorCtr="0">
           <a:noAutofit/>
         </a:bodyPr>
         <a:lstStyle/>
         <a:p>
-          <a:pPr marL="0" lvl="0" indent="0" algn="ctr" defTabSz="1200150">
+          <a:pPr marL="0" lvl="0" indent="0" algn="ctr" defTabSz="977900">
             <a:lnSpc>
               <a:spcPct val="90000"/>
             </a:lnSpc>
@@ -14045,14 +14157,14 @@
             <a:buNone/>
           </a:pPr>
           <a:r>
-            <a:rPr lang="en-US" sz="2700" kern="1200"/>
+            <a:rPr lang="en-US" sz="2200" kern="1200"/>
             <a:t>Global fit code coming</a:t>
           </a:r>
         </a:p>
       </dsp:txBody>
       <dsp:txXfrm>
-        <a:off x="3398135" y="2067556"/>
-        <a:ext cx="3088494" cy="1371606"/>
+        <a:off x="3366934" y="1343563"/>
+        <a:ext cx="2464460" cy="1094471"/>
       </dsp:txXfrm>
     </dsp:sp>
     <dsp:sp modelId="{8DEF1356-1D32-F645-87CF-B51FB51B0C8F}">
@@ -14062,8 +14174,8 @@
       </dsp:nvSpPr>
       <dsp:spPr>
         <a:xfrm>
-          <a:off x="791" y="3748012"/>
-          <a:ext cx="3088494" cy="1371606"/>
+          <a:off x="656027" y="2684480"/>
+          <a:ext cx="2464460" cy="1094471"/>
         </a:xfrm>
         <a:prstGeom prst="rect">
           <a:avLst/>
@@ -14091,12 +14203,12 @@
         </a:fontRef>
       </dsp:style>
       <dsp:txBody>
-        <a:bodyPr spcFirstLastPara="0" vert="horz" wrap="square" lIns="102870" tIns="102870" rIns="102870" bIns="102870" numCol="1" spcCol="1270" anchor="ctr" anchorCtr="0">
+        <a:bodyPr spcFirstLastPara="0" vert="horz" wrap="square" lIns="83820" tIns="83820" rIns="83820" bIns="83820" numCol="1" spcCol="1270" anchor="ctr" anchorCtr="0">
           <a:noAutofit/>
         </a:bodyPr>
         <a:lstStyle/>
         <a:p>
-          <a:pPr marL="0" lvl="0" indent="0" algn="ctr" defTabSz="1200150">
+          <a:pPr marL="0" lvl="0" indent="0" algn="ctr" defTabSz="977900">
             <a:lnSpc>
               <a:spcPct val="90000"/>
             </a:lnSpc>
@@ -14109,30 +14221,30 @@
             <a:buNone/>
           </a:pPr>
           <a:r>
-            <a:rPr lang="en-US" sz="2700" kern="1200" dirty="0"/>
+            <a:rPr lang="en-US" sz="2200" kern="1200" dirty="0"/>
             <a:t>Integrate </a:t>
           </a:r>
           <a:r>
-            <a:rPr lang="en-US" sz="2700" kern="1200" dirty="0" err="1"/>
+            <a:rPr lang="en-US" sz="2200" kern="1200" dirty="0" err="1"/>
             <a:t>lisacattools</a:t>
           </a:r>
           <a:r>
-            <a:rPr lang="en-US" sz="2700" kern="1200" dirty="0"/>
+            <a:rPr lang="en-US" sz="2200" kern="1200" dirty="0"/>
             <a:t> (</a:t>
           </a:r>
           <a:r>
-            <a:rPr lang="en-US" sz="2700" kern="1200" dirty="0" err="1"/>
+            <a:rPr lang="en-US" sz="2200" kern="1200" dirty="0" err="1"/>
             <a:t>Littenberg</a:t>
           </a:r>
           <a:r>
-            <a:rPr lang="en-US" sz="2700" kern="1200" dirty="0"/>
+            <a:rPr lang="en-US" sz="2200" kern="1200" dirty="0"/>
             <a:t>+)</a:t>
           </a:r>
         </a:p>
       </dsp:txBody>
       <dsp:txXfrm>
-        <a:off x="791" y="3748012"/>
-        <a:ext cx="3088494" cy="1371606"/>
+        <a:off x="656027" y="2684480"/>
+        <a:ext cx="2464460" cy="1094471"/>
       </dsp:txXfrm>
     </dsp:sp>
     <dsp:sp modelId="{066A581C-BF34-4144-8F0D-B6A0CCE98E9D}">
@@ -14142,8 +14254,8 @@
       </dsp:nvSpPr>
       <dsp:spPr>
         <a:xfrm>
-          <a:off x="3398135" y="3748012"/>
-          <a:ext cx="3088494" cy="1371606"/>
+          <a:off x="3366934" y="2684480"/>
+          <a:ext cx="2464460" cy="1094471"/>
         </a:xfrm>
         <a:prstGeom prst="rect">
           <a:avLst/>
@@ -14171,12 +14283,12 @@
         </a:fontRef>
       </dsp:style>
       <dsp:txBody>
-        <a:bodyPr spcFirstLastPara="0" vert="horz" wrap="square" lIns="102870" tIns="102870" rIns="102870" bIns="102870" numCol="1" spcCol="1270" anchor="ctr" anchorCtr="0">
+        <a:bodyPr spcFirstLastPara="0" vert="horz" wrap="square" lIns="83820" tIns="83820" rIns="83820" bIns="83820" numCol="1" spcCol="1270" anchor="ctr" anchorCtr="0">
           <a:noAutofit/>
         </a:bodyPr>
         <a:lstStyle/>
         <a:p>
-          <a:pPr marL="0" lvl="0" indent="0" algn="ctr" defTabSz="1200150">
+          <a:pPr marL="0" lvl="0" indent="0" algn="ctr" defTabSz="977900">
             <a:lnSpc>
               <a:spcPct val="90000"/>
             </a:lnSpc>
@@ -14189,22 +14301,150 @@
             <a:buNone/>
           </a:pPr>
           <a:r>
-            <a:rPr lang="en-US" sz="2700" kern="1200" dirty="0"/>
+            <a:rPr lang="en-US" sz="2200" kern="1200" dirty="0"/>
             <a:t>More waveform types (e.g. EMRIs, </a:t>
           </a:r>
           <a:r>
-            <a:rPr lang="en-US" sz="2700" kern="1200" dirty="0" err="1"/>
+            <a:rPr lang="en-US" sz="2200" kern="1200" dirty="0" err="1"/>
             <a:t>lisabeta</a:t>
           </a:r>
           <a:r>
-            <a:rPr lang="en-US" sz="2700" kern="1200" dirty="0"/>
+            <a:rPr lang="en-US" sz="2200" kern="1200" dirty="0"/>
             <a:t>)</a:t>
           </a:r>
         </a:p>
       </dsp:txBody>
       <dsp:txXfrm>
-        <a:off x="3398135" y="3748012"/>
-        <a:ext cx="3088494" cy="1371606"/>
+        <a:off x="3366934" y="2684480"/>
+        <a:ext cx="2464460" cy="1094471"/>
+      </dsp:txXfrm>
+    </dsp:sp>
+    <dsp:sp modelId="{41799A00-12C1-1140-8A4E-2B952DF57F2E}">
+      <dsp:nvSpPr>
+        <dsp:cNvPr id="0" name=""/>
+        <dsp:cNvSpPr/>
+      </dsp:nvSpPr>
+      <dsp:spPr>
+        <a:xfrm>
+          <a:off x="656027" y="4025398"/>
+          <a:ext cx="2464460" cy="1478676"/>
+        </a:xfrm>
+        <a:prstGeom prst="rect">
+          <a:avLst/>
+        </a:prstGeom>
+        <a:solidFill>
+          <a:srgbClr val="00C6BB"/>
+        </a:solidFill>
+        <a:ln>
+          <a:noFill/>
+        </a:ln>
+        <a:effectLst/>
+      </dsp:spPr>
+      <dsp:style>
+        <a:lnRef idx="0">
+          <a:scrgbClr r="0" g="0" b="0"/>
+        </a:lnRef>
+        <a:fillRef idx="3">
+          <a:scrgbClr r="0" g="0" b="0"/>
+        </a:fillRef>
+        <a:effectRef idx="2">
+          <a:scrgbClr r="0" g="0" b="0"/>
+        </a:effectRef>
+        <a:fontRef idx="minor">
+          <a:schemeClr val="lt1"/>
+        </a:fontRef>
+      </dsp:style>
+      <dsp:txBody>
+        <a:bodyPr spcFirstLastPara="0" vert="horz" wrap="square" lIns="83820" tIns="83820" rIns="83820" bIns="83820" numCol="1" spcCol="1270" anchor="ctr" anchorCtr="0">
+          <a:noAutofit/>
+        </a:bodyPr>
+        <a:lstStyle/>
+        <a:p>
+          <a:pPr marL="0" lvl="0" indent="0" algn="ctr" defTabSz="977900">
+            <a:lnSpc>
+              <a:spcPct val="90000"/>
+            </a:lnSpc>
+            <a:spcBef>
+              <a:spcPct val="0"/>
+            </a:spcBef>
+            <a:spcAft>
+              <a:spcPct val="35000"/>
+            </a:spcAft>
+            <a:buNone/>
+          </a:pPr>
+          <a:r>
+            <a:rPr lang="en-US" sz="2200" kern="1200" dirty="0"/>
+            <a:t>GPU parallelized multiple ensemble samplers</a:t>
+          </a:r>
+        </a:p>
+      </dsp:txBody>
+      <dsp:txXfrm>
+        <a:off x="656027" y="4025398"/>
+        <a:ext cx="2464460" cy="1478676"/>
+      </dsp:txXfrm>
+    </dsp:sp>
+    <dsp:sp modelId="{4AA387BF-569B-354E-BBEC-1485AC97748F}">
+      <dsp:nvSpPr>
+        <dsp:cNvPr id="0" name=""/>
+        <dsp:cNvSpPr/>
+      </dsp:nvSpPr>
+      <dsp:spPr>
+        <a:xfrm>
+          <a:off x="3366934" y="4025398"/>
+          <a:ext cx="2464460" cy="1478676"/>
+        </a:xfrm>
+        <a:prstGeom prst="rect">
+          <a:avLst/>
+        </a:prstGeom>
+        <a:solidFill>
+          <a:srgbClr val="00C6BB"/>
+        </a:solidFill>
+        <a:ln>
+          <a:noFill/>
+        </a:ln>
+        <a:effectLst/>
+      </dsp:spPr>
+      <dsp:style>
+        <a:lnRef idx="0">
+          <a:scrgbClr r="0" g="0" b="0"/>
+        </a:lnRef>
+        <a:fillRef idx="3">
+          <a:scrgbClr r="0" g="0" b="0"/>
+        </a:fillRef>
+        <a:effectRef idx="2">
+          <a:scrgbClr r="0" g="0" b="0"/>
+        </a:effectRef>
+        <a:fontRef idx="minor">
+          <a:schemeClr val="lt1"/>
+        </a:fontRef>
+      </dsp:style>
+      <dsp:txBody>
+        <a:bodyPr spcFirstLastPara="0" vert="horz" wrap="square" lIns="83820" tIns="83820" rIns="83820" bIns="83820" numCol="1" spcCol="1270" anchor="ctr" anchorCtr="0">
+          <a:noAutofit/>
+        </a:bodyPr>
+        <a:lstStyle/>
+        <a:p>
+          <a:pPr marL="0" lvl="0" indent="0" algn="ctr" defTabSz="977900">
+            <a:lnSpc>
+              <a:spcPct val="90000"/>
+            </a:lnSpc>
+            <a:spcBef>
+              <a:spcPct val="0"/>
+            </a:spcBef>
+            <a:spcAft>
+              <a:spcPct val="35000"/>
+            </a:spcAft>
+            <a:buNone/>
+          </a:pPr>
+          <a:r>
+            <a:rPr lang="en-US" sz="2200" kern="1200" dirty="0"/>
+            <a:t>GPU pip install</a:t>
+          </a:r>
+        </a:p>
+      </dsp:txBody>
+      <dsp:txXfrm>
+        <a:off x="3366934" y="4025398"/>
+        <a:ext cx="2464460" cy="1478676"/>
       </dsp:txXfrm>
     </dsp:sp>
   </dsp:spTree>
@@ -26364,7 +26604,7 @@
           <a:p>
             <a:fld id="{4534C97C-E08F-3A44-8281-EC8F0FDC876D}" type="datetimeFigureOut">
               <a:rPr lang="en-US" smtClean="0"/>
-              <a:t>4/12/24</a:t>
+              <a:t>4/13/24</a:t>
             </a:fld>
             <a:endParaRPr lang="en-US"/>
           </a:p>
@@ -27020,7 +27260,7 @@
           <a:effectLst/>
           <a:extLst>
             <a:ext uri="{91240B29-F687-4f45-9708-019B960494DF}">
-              <a14:hiddenLine xmlns:a14="http://schemas.microsoft.com/office/drawing/2010/main" xmlns="" w="9525">
+              <a14:hiddenLine xmlns="" xmlns:a14="http://schemas.microsoft.com/office/drawing/2010/main" w="9525">
                 <a:solidFill>
                   <a:srgbClr val="000000"/>
                 </a:solidFill>
@@ -27212,7 +27452,7 @@
           <a:p>
             <a:fld id="{C5BFD16A-B314-B742-B85F-49431BFC0682}" type="datetimeFigureOut">
               <a:rPr lang="en-US" smtClean="0"/>
-              <a:t>4/12/24</a:t>
+              <a:t>4/13/24</a:t>
             </a:fld>
             <a:endParaRPr lang="en-US"/>
           </a:p>
@@ -27530,7 +27770,7 @@
           <a:p>
             <a:fld id="{C5BFD16A-B314-B742-B85F-49431BFC0682}" type="datetimeFigureOut">
               <a:rPr lang="en-US" smtClean="0"/>
-              <a:t>4/12/24</a:t>
+              <a:t>4/13/24</a:t>
             </a:fld>
             <a:endParaRPr lang="en-US"/>
           </a:p>
@@ -28018,7 +28258,7 @@
           <a:p>
             <a:fld id="{C5BFD16A-B314-B742-B85F-49431BFC0682}" type="datetimeFigureOut">
               <a:rPr lang="en-US" smtClean="0"/>
-              <a:t>4/12/24</a:t>
+              <a:t>4/13/24</a:t>
             </a:fld>
             <a:endParaRPr lang="en-US"/>
           </a:p>
@@ -28387,7 +28627,7 @@
           <a:p>
             <a:fld id="{C5BFD16A-B314-B742-B85F-49431BFC0682}" type="datetimeFigureOut">
               <a:rPr lang="en-US" smtClean="0"/>
-              <a:t>4/12/24</a:t>
+              <a:t>4/13/24</a:t>
             </a:fld>
             <a:endParaRPr lang="en-US"/>
           </a:p>
@@ -28542,7 +28782,7 @@
           <a:ln/>
           <a:extLst>
             <a:ext uri="{91240B29-F687-4f45-9708-019B960494DF}">
-              <a14:hiddenLine xmlns:a14="http://schemas.microsoft.com/office/drawing/2010/main" xmlns="" w="9525">
+              <a14:hiddenLine xmlns="" xmlns:a14="http://schemas.microsoft.com/office/drawing/2010/main" w="9525">
                 <a:solidFill>
                   <a:srgbClr val="000000"/>
                 </a:solidFill>
@@ -28660,7 +28900,7 @@
           <a:p>
             <a:fld id="{C5BFD16A-B314-B742-B85F-49431BFC0682}" type="datetimeFigureOut">
               <a:rPr lang="en-US" smtClean="0"/>
-              <a:t>4/12/24</a:t>
+              <a:t>4/13/24</a:t>
             </a:fld>
             <a:endParaRPr lang="en-US"/>
           </a:p>
@@ -28817,7 +29057,7 @@
           <a:ln/>
           <a:extLst>
             <a:ext uri="{91240B29-F687-4f45-9708-019B960494DF}">
-              <a14:hiddenLine xmlns:a14="http://schemas.microsoft.com/office/drawing/2010/main" xmlns="" w="9525">
+              <a14:hiddenLine xmlns="" xmlns:a14="http://schemas.microsoft.com/office/drawing/2010/main" w="9525">
                 <a:solidFill>
                   <a:srgbClr val="000000"/>
                 </a:solidFill>
@@ -28945,7 +29185,7 @@
           <a:p>
             <a:fld id="{C5BFD16A-B314-B742-B85F-49431BFC0682}" type="datetimeFigureOut">
               <a:rPr lang="en-US" smtClean="0"/>
-              <a:t>4/12/24</a:t>
+              <a:t>4/13/24</a:t>
             </a:fld>
             <a:endParaRPr lang="en-US"/>
           </a:p>
@@ -29100,7 +29340,7 @@
           <a:ln/>
           <a:extLst>
             <a:ext uri="{91240B29-F687-4f45-9708-019B960494DF}">
-              <a14:hiddenLine xmlns:a14="http://schemas.microsoft.com/office/drawing/2010/main" xmlns="" w="9525">
+              <a14:hiddenLine xmlns="" xmlns:a14="http://schemas.microsoft.com/office/drawing/2010/main" w="9525">
                 <a:solidFill>
                   <a:srgbClr val="000000"/>
                 </a:solidFill>
@@ -29228,7 +29468,7 @@
           <a:p>
             <a:fld id="{C5BFD16A-B314-B742-B85F-49431BFC0682}" type="datetimeFigureOut">
               <a:rPr lang="en-US" smtClean="0"/>
-              <a:t>4/12/24</a:t>
+              <a:t>4/13/24</a:t>
             </a:fld>
             <a:endParaRPr lang="en-US"/>
           </a:p>
@@ -29571,7 +29811,7 @@
           <a:p>
             <a:fld id="{C5BFD16A-B314-B742-B85F-49431BFC0682}" type="datetimeFigureOut">
               <a:rPr lang="en-US" smtClean="0"/>
-              <a:t>4/12/24</a:t>
+              <a:t>4/13/24</a:t>
             </a:fld>
             <a:endParaRPr lang="en-US"/>
           </a:p>
@@ -29726,7 +29966,7 @@
           <a:ln/>
           <a:extLst>
             <a:ext uri="{91240B29-F687-4f45-9708-019B960494DF}">
-              <a14:hiddenLine xmlns:a14="http://schemas.microsoft.com/office/drawing/2010/main" xmlns="" w="9525">
+              <a14:hiddenLine xmlns="" xmlns:a14="http://schemas.microsoft.com/office/drawing/2010/main" w="9525">
                 <a:solidFill>
                   <a:srgbClr val="000000"/>
                 </a:solidFill>
@@ -29910,7 +30150,7 @@
           <a:p>
             <a:fld id="{C5BFD16A-B314-B742-B85F-49431BFC0682}" type="datetimeFigureOut">
               <a:rPr lang="en-US" smtClean="0"/>
-              <a:t>4/12/24</a:t>
+              <a:t>4/13/24</a:t>
             </a:fld>
             <a:endParaRPr lang="en-US"/>
           </a:p>
@@ -30065,7 +30305,7 @@
           <a:ln/>
           <a:extLst>
             <a:ext uri="{91240B29-F687-4f45-9708-019B960494DF}">
-              <a14:hiddenLine xmlns:a14="http://schemas.microsoft.com/office/drawing/2010/main" xmlns="" w="9525">
+              <a14:hiddenLine xmlns="" xmlns:a14="http://schemas.microsoft.com/office/drawing/2010/main" w="9525">
                 <a:solidFill>
                   <a:srgbClr val="000000"/>
                 </a:solidFill>
@@ -30387,7 +30627,7 @@
           <a:p>
             <a:fld id="{C5BFD16A-B314-B742-B85F-49431BFC0682}" type="datetimeFigureOut">
               <a:rPr lang="en-US" smtClean="0"/>
-              <a:t>4/12/24</a:t>
+              <a:t>4/13/24</a:t>
             </a:fld>
             <a:endParaRPr lang="en-US"/>
           </a:p>
@@ -30542,7 +30782,7 @@
           <a:ln/>
           <a:extLst>
             <a:ext uri="{91240B29-F687-4f45-9708-019B960494DF}">
-              <a14:hiddenLine xmlns:a14="http://schemas.microsoft.com/office/drawing/2010/main" xmlns="" w="9525">
+              <a14:hiddenLine xmlns="" xmlns:a14="http://schemas.microsoft.com/office/drawing/2010/main" w="9525">
                 <a:solidFill>
                   <a:srgbClr val="000000"/>
                 </a:solidFill>
@@ -30608,7 +30848,7 @@
           <a:p>
             <a:fld id="{C5BFD16A-B314-B742-B85F-49431BFC0682}" type="datetimeFigureOut">
               <a:rPr lang="en-US" smtClean="0"/>
-              <a:t>4/12/24</a:t>
+              <a:t>4/13/24</a:t>
             </a:fld>
             <a:endParaRPr lang="en-US"/>
           </a:p>
@@ -30703,7 +30943,7 @@
           <a:p>
             <a:fld id="{C5BFD16A-B314-B742-B85F-49431BFC0682}" type="datetimeFigureOut">
               <a:rPr lang="en-US" smtClean="0"/>
-              <a:t>4/12/24</a:t>
+              <a:t>4/13/24</a:t>
             </a:fld>
             <a:endParaRPr lang="en-US"/>
           </a:p>
@@ -30971,7 +31211,7 @@
           <a:ln/>
           <a:extLst>
             <a:ext uri="{91240B29-F687-4f45-9708-019B960494DF}">
-              <a14:hiddenLine xmlns:a14="http://schemas.microsoft.com/office/drawing/2010/main" xmlns="" w="9525">
+              <a14:hiddenLine xmlns="" xmlns:a14="http://schemas.microsoft.com/office/drawing/2010/main" w="9525">
                 <a:solidFill>
                   <a:srgbClr val="000000"/>
                 </a:solidFill>
@@ -31170,7 +31410,7 @@
           <a:p>
             <a:fld id="{C5BFD16A-B314-B742-B85F-49431BFC0682}" type="datetimeFigureOut">
               <a:rPr lang="en-US" smtClean="0"/>
-              <a:t>4/12/24</a:t>
+              <a:t>4/13/24</a:t>
             </a:fld>
             <a:endParaRPr lang="en-US"/>
           </a:p>
@@ -31483,7 +31723,7 @@
           <a:p>
             <a:fld id="{C5BFD16A-B314-B742-B85F-49431BFC0682}" type="datetimeFigureOut">
               <a:rPr lang="en-US" smtClean="0"/>
-              <a:t>4/12/24</a:t>
+              <a:t>4/13/24</a:t>
             </a:fld>
             <a:endParaRPr lang="en-US"/>
           </a:p>
@@ -31753,7 +31993,7 @@
           <a:p>
             <a:fld id="{C5BFD16A-B314-B742-B85F-49431BFC0682}" type="datetimeFigureOut">
               <a:rPr lang="en-US" smtClean="0"/>
-              <a:t>4/12/24</a:t>
+              <a:t>4/13/24</a:t>
             </a:fld>
             <a:endParaRPr lang="en-US"/>
           </a:p>
@@ -32894,7 +33134,7 @@
             <p:ph idx="1"/>
             <p:extLst>
               <p:ext uri="{D42A27DB-BD31-4B8C-83A1-F6EECF244321}">
-                <p14:modId xmlns:p14="http://schemas.microsoft.com/office/powerpoint/2010/main" val="3756119735"/>
+                <p14:modId xmlns:p14="http://schemas.microsoft.com/office/powerpoint/2010/main" val="1457672477"/>
               </p:ext>
             </p:extLst>
           </p:nvPr>
@@ -32909,6 +33149,41 @@
           </a:graphicData>
         </a:graphic>
       </p:graphicFrame>
+      <p:sp>
+        <p:nvSpPr>
+          <p:cNvPr id="3" name="TextBox 2">
+            <a:extLst>
+              <a:ext uri="{FF2B5EF4-FFF2-40B4-BE49-F238E27FC236}">
+                <a16:creationId xmlns:a16="http://schemas.microsoft.com/office/drawing/2014/main" id="{EB6B9F02-CE1C-53B3-BB25-2E4975CEA58F}"/>
+              </a:ext>
+            </a:extLst>
+          </p:cNvPr>
+          <p:cNvSpPr txBox="1"/>
+          <p:nvPr/>
+        </p:nvSpPr>
+        <p:spPr>
+          <a:xfrm>
+            <a:off x="710443" y="5170714"/>
+            <a:ext cx="3132083" cy="1200329"/>
+          </a:xfrm>
+          <a:prstGeom prst="rect">
+            <a:avLst/>
+          </a:prstGeom>
+          <a:noFill/>
+        </p:spPr>
+        <p:txBody>
+          <a:bodyPr wrap="square" rtlCol="0">
+            <a:spAutoFit/>
+          </a:bodyPr>
+          <a:lstStyle/>
+          <a:p>
+            <a:r>
+              <a:rPr lang="en-US" b="1" dirty="0"/>
+              <a:t>If you are interested in doing the work of one of these projects, please let me know.</a:t>
+            </a:r>
+          </a:p>
+        </p:txBody>
+      </p:sp>
     </p:spTree>
     <p:extLst>
       <p:ext uri="{BB962C8B-B14F-4D97-AF65-F5344CB8AC3E}">

</xml_diff>